<commit_message>
Update dependencies and plot levee profiles
</commit_message>
<xml_diff>
--- a/artificiallevees2.pptx
+++ b/artificiallevees2.pptx
@@ -11,6 +11,7 @@
     <p:sldId id="278" r:id="rId5"/>
     <p:sldId id="279" r:id="rId6"/>
     <p:sldId id="280" r:id="rId7"/>
+    <p:sldId id="281" r:id="rId8"/>
   </p:sldIdLst>
   <p:sldSz cx="12192000" cy="6858000"/>
   <p:notesSz cx="6858000" cy="9144000"/>
@@ -109,6 +110,11 @@
       </a:defRPr>
     </a:lvl9pPr>
   </p:defaultTextStyle>
+  <p:extLst>
+    <p:ext uri="{EFAFB233-063F-42B5-8137-9DF3F51BA10A}">
+      <p15:sldGuideLst xmlns:p15="http://schemas.microsoft.com/office/powerpoint/2012/main"/>
+    </p:ext>
+  </p:extLst>
 </p:presentation>
 </file>
 
@@ -595,7 +601,7 @@
           <a:p>
             <a:fld id="{767F5727-B14E-4949-9BC2-0DFEAC4066E5}" type="datetimeFigureOut">
               <a:rPr lang="en-US" smtClean="0"/>
-              <a:t>2/15/24</a:t>
+              <a:t>2/16/24</a:t>
             </a:fld>
             <a:endParaRPr lang="en-US"/>
           </a:p>
@@ -793,7 +799,7 @@
           <a:p>
             <a:fld id="{767F5727-B14E-4949-9BC2-0DFEAC4066E5}" type="datetimeFigureOut">
               <a:rPr lang="en-US" smtClean="0"/>
-              <a:t>2/15/24</a:t>
+              <a:t>2/16/24</a:t>
             </a:fld>
             <a:endParaRPr lang="en-US"/>
           </a:p>
@@ -1001,7 +1007,7 @@
           <a:p>
             <a:fld id="{767F5727-B14E-4949-9BC2-0DFEAC4066E5}" type="datetimeFigureOut">
               <a:rPr lang="en-US" smtClean="0"/>
-              <a:t>2/15/24</a:t>
+              <a:t>2/16/24</a:t>
             </a:fld>
             <a:endParaRPr lang="en-US"/>
           </a:p>
@@ -1199,7 +1205,7 @@
           <a:p>
             <a:fld id="{767F5727-B14E-4949-9BC2-0DFEAC4066E5}" type="datetimeFigureOut">
               <a:rPr lang="en-US" smtClean="0"/>
-              <a:t>2/15/24</a:t>
+              <a:t>2/16/24</a:t>
             </a:fld>
             <a:endParaRPr lang="en-US"/>
           </a:p>
@@ -1474,7 +1480,7 @@
           <a:p>
             <a:fld id="{767F5727-B14E-4949-9BC2-0DFEAC4066E5}" type="datetimeFigureOut">
               <a:rPr lang="en-US" smtClean="0"/>
-              <a:t>2/15/24</a:t>
+              <a:t>2/16/24</a:t>
             </a:fld>
             <a:endParaRPr lang="en-US"/>
           </a:p>
@@ -1739,7 +1745,7 @@
           <a:p>
             <a:fld id="{767F5727-B14E-4949-9BC2-0DFEAC4066E5}" type="datetimeFigureOut">
               <a:rPr lang="en-US" smtClean="0"/>
-              <a:t>2/15/24</a:t>
+              <a:t>2/16/24</a:t>
             </a:fld>
             <a:endParaRPr lang="en-US"/>
           </a:p>
@@ -2151,7 +2157,7 @@
           <a:p>
             <a:fld id="{767F5727-B14E-4949-9BC2-0DFEAC4066E5}" type="datetimeFigureOut">
               <a:rPr lang="en-US" smtClean="0"/>
-              <a:t>2/15/24</a:t>
+              <a:t>2/16/24</a:t>
             </a:fld>
             <a:endParaRPr lang="en-US"/>
           </a:p>
@@ -2292,7 +2298,7 @@
           <a:p>
             <a:fld id="{767F5727-B14E-4949-9BC2-0DFEAC4066E5}" type="datetimeFigureOut">
               <a:rPr lang="en-US" smtClean="0"/>
-              <a:t>2/15/24</a:t>
+              <a:t>2/16/24</a:t>
             </a:fld>
             <a:endParaRPr lang="en-US"/>
           </a:p>
@@ -2405,7 +2411,7 @@
           <a:p>
             <a:fld id="{767F5727-B14E-4949-9BC2-0DFEAC4066E5}" type="datetimeFigureOut">
               <a:rPr lang="en-US" smtClean="0"/>
-              <a:t>2/15/24</a:t>
+              <a:t>2/16/24</a:t>
             </a:fld>
             <a:endParaRPr lang="en-US"/>
           </a:p>
@@ -2716,7 +2722,7 @@
           <a:p>
             <a:fld id="{767F5727-B14E-4949-9BC2-0DFEAC4066E5}" type="datetimeFigureOut">
               <a:rPr lang="en-US" smtClean="0"/>
-              <a:t>2/15/24</a:t>
+              <a:t>2/16/24</a:t>
             </a:fld>
             <a:endParaRPr lang="en-US"/>
           </a:p>
@@ -3004,7 +3010,7 @@
           <a:p>
             <a:fld id="{767F5727-B14E-4949-9BC2-0DFEAC4066E5}" type="datetimeFigureOut">
               <a:rPr lang="en-US" smtClean="0"/>
-              <a:t>2/15/24</a:t>
+              <a:t>2/16/24</a:t>
             </a:fld>
             <a:endParaRPr lang="en-US"/>
           </a:p>
@@ -3245,7 +3251,7 @@
           <a:p>
             <a:fld id="{767F5727-B14E-4949-9BC2-0DFEAC4066E5}" type="datetimeFigureOut">
               <a:rPr lang="en-US" smtClean="0"/>
-              <a:t>2/15/24</a:t>
+              <a:t>2/16/24</a:t>
             </a:fld>
             <a:endParaRPr lang="en-US"/>
           </a:p>
@@ -3822,7 +3828,7 @@
           <a:p>
             <a:r>
               <a:rPr lang="en-US" dirty="0"/>
-              <a:t>3DEP: USGS 10m contiguous bare-earth lidar product.</a:t>
+              <a:t>3DEP: USGS 1m contiguous bare-earth lidar product.</a:t>
             </a:r>
           </a:p>
           <a:p>
@@ -3953,14 +3959,13 @@
         </p:nvPicPr>
         <p:blipFill>
           <a:blip r:embed="rId2"/>
-          <a:stretch>
-            <a:fillRect/>
-          </a:stretch>
+          <a:srcRect/>
+          <a:stretch/>
         </p:blipFill>
         <p:spPr>
           <a:xfrm>
             <a:off x="399261" y="979777"/>
-            <a:ext cx="5696739" cy="3700850"/>
+            <a:ext cx="5696738" cy="3700850"/>
           </a:xfrm>
           <a:prstGeom prst="rect">
             <a:avLst/>
@@ -4225,14 +4230,13 @@
         </p:nvPicPr>
         <p:blipFill>
           <a:blip r:embed="rId2"/>
-          <a:stretch>
-            <a:fillRect/>
-          </a:stretch>
+          <a:srcRect/>
+          <a:stretch/>
         </p:blipFill>
         <p:spPr>
           <a:xfrm>
-            <a:off x="838200" y="934087"/>
-            <a:ext cx="6028426" cy="3838822"/>
+            <a:off x="838201" y="934087"/>
+            <a:ext cx="6028424" cy="3838822"/>
           </a:xfrm>
           <a:prstGeom prst="rect">
             <a:avLst/>
@@ -4427,14 +4431,13 @@
         </p:nvPicPr>
         <p:blipFill>
           <a:blip r:embed="rId2"/>
-          <a:stretch>
-            <a:fillRect/>
-          </a:stretch>
+          <a:srcRect/>
+          <a:stretch/>
         </p:blipFill>
         <p:spPr>
           <a:xfrm>
             <a:off x="463995" y="972867"/>
-            <a:ext cx="6644171" cy="4230921"/>
+            <a:ext cx="6644170" cy="4230921"/>
           </a:xfrm>
           <a:prstGeom prst="rect">
             <a:avLst/>
@@ -4642,14 +4645,13 @@
         </p:nvPicPr>
         <p:blipFill>
           <a:blip r:embed="rId3"/>
-          <a:stretch>
-            <a:fillRect/>
-          </a:stretch>
+          <a:srcRect/>
+          <a:stretch/>
         </p:blipFill>
         <p:spPr>
           <a:xfrm>
-            <a:off x="425754" y="1398739"/>
-            <a:ext cx="6376575" cy="4060519"/>
+            <a:off x="425756" y="1194468"/>
+            <a:ext cx="6376573" cy="4060519"/>
           </a:xfrm>
           <a:prstGeom prst="rect">
             <a:avLst/>
@@ -4699,57 +4701,8 @@
           </a:p>
         </p:txBody>
       </p:sp>
-      <p:sp>
-        <p:nvSpPr>
-          <p:cNvPr id="7" name="Down Arrow 6">
-            <a:extLst>
-              <a:ext uri="{FF2B5EF4-FFF2-40B4-BE49-F238E27FC236}">
-                <a16:creationId xmlns:a16="http://schemas.microsoft.com/office/drawing/2014/main" id="{2A871A34-CC58-88FB-C779-682E39FFE27C}"/>
-              </a:ext>
-            </a:extLst>
-          </p:cNvPr>
-          <p:cNvSpPr/>
-          <p:nvPr/>
-        </p:nvSpPr>
-        <p:spPr>
-          <a:xfrm rot="16200000">
-            <a:off x="9163157" y="2278900"/>
-            <a:ext cx="241758" cy="1088699"/>
-          </a:xfrm>
-          <a:prstGeom prst="downArrow">
-            <a:avLst/>
-          </a:prstGeom>
-          <a:solidFill>
-            <a:schemeClr val="bg1"/>
-          </a:solidFill>
-        </p:spPr>
-        <p:style>
-          <a:lnRef idx="2">
-            <a:schemeClr val="accent1">
-              <a:shade val="15000"/>
-            </a:schemeClr>
-          </a:lnRef>
-          <a:fillRef idx="1">
-            <a:schemeClr val="accent1"/>
-          </a:fillRef>
-          <a:effectRef idx="0">
-            <a:schemeClr val="accent1"/>
-          </a:effectRef>
-          <a:fontRef idx="minor">
-            <a:schemeClr val="lt1"/>
-          </a:fontRef>
-        </p:style>
-        <p:txBody>
-          <a:bodyPr rtlCol="0" anchor="ctr"/>
-          <a:lstStyle/>
-          <a:p>
-            <a:pPr algn="ctr"/>
-            <a:endParaRPr lang="en-US"/>
-          </a:p>
-        </p:txBody>
-      </p:sp>
-      <mc:AlternateContent xmlns:mc="http://schemas.openxmlformats.org/markup-compatibility/2006">
-        <mc:Choice xmlns:p14="http://schemas.microsoft.com/office/powerpoint/2010/main" Requires="p14">
+      <mc:AlternateContent xmlns:mc="http://schemas.openxmlformats.org/markup-compatibility/2006" xmlns:p14="http://schemas.microsoft.com/office/powerpoint/2010/main">
+        <mc:Choice Requires="p14">
           <p:contentPart p14:bwMode="auto" r:id="rId4">
             <p14:nvContentPartPr>
               <p14:cNvPr id="8" name="Ink 7">
@@ -4768,7 +4721,7 @@
             </p14:xfrm>
           </p:contentPart>
         </mc:Choice>
-        <mc:Fallback>
+        <mc:Fallback xmlns="">
           <p:pic>
             <p:nvPicPr>
               <p:cNvPr id="8" name="Ink 7">
@@ -4799,8 +4752,8 @@
           </p:pic>
         </mc:Fallback>
       </mc:AlternateContent>
-      <mc:AlternateContent xmlns:mc="http://schemas.openxmlformats.org/markup-compatibility/2006">
-        <mc:Choice xmlns:p14="http://schemas.microsoft.com/office/powerpoint/2010/main" Requires="p14">
+      <mc:AlternateContent xmlns:mc="http://schemas.openxmlformats.org/markup-compatibility/2006" xmlns:p14="http://schemas.microsoft.com/office/powerpoint/2010/main">
+        <mc:Choice Requires="p14">
           <p:contentPart p14:bwMode="auto" r:id="rId6">
             <p14:nvContentPartPr>
               <p14:cNvPr id="9" name="Ink 8">
@@ -4819,7 +4772,7 @@
             </p14:xfrm>
           </p:contentPart>
         </mc:Choice>
-        <mc:Fallback>
+        <mc:Fallback xmlns="">
           <p:pic>
             <p:nvPicPr>
               <p:cNvPr id="9" name="Ink 8">
@@ -4870,8 +4823,8 @@
             <a:chExt cx="1865160" cy="204480"/>
           </a:xfrm>
         </p:grpSpPr>
-        <mc:AlternateContent xmlns:mc="http://schemas.openxmlformats.org/markup-compatibility/2006">
-          <mc:Choice xmlns:p14="http://schemas.microsoft.com/office/powerpoint/2010/main" Requires="p14">
+        <mc:AlternateContent xmlns:mc="http://schemas.openxmlformats.org/markup-compatibility/2006" xmlns:p14="http://schemas.microsoft.com/office/powerpoint/2010/main">
+          <mc:Choice Requires="p14">
             <p:contentPart p14:bwMode="auto" r:id="rId8">
               <p14:nvContentPartPr>
                 <p14:cNvPr id="10" name="Ink 9">
@@ -4890,7 +4843,7 @@
               </p14:xfrm>
             </p:contentPart>
           </mc:Choice>
-          <mc:Fallback>
+          <mc:Fallback xmlns="">
             <p:pic>
               <p:nvPicPr>
                 <p:cNvPr id="10" name="Ink 9">
@@ -4921,8 +4874,8 @@
             </p:pic>
           </mc:Fallback>
         </mc:AlternateContent>
-        <mc:AlternateContent xmlns:mc="http://schemas.openxmlformats.org/markup-compatibility/2006">
-          <mc:Choice xmlns:p14="http://schemas.microsoft.com/office/powerpoint/2010/main" Requires="p14">
+        <mc:AlternateContent xmlns:mc="http://schemas.openxmlformats.org/markup-compatibility/2006" xmlns:p14="http://schemas.microsoft.com/office/powerpoint/2010/main">
+          <mc:Choice Requires="p14">
             <p:contentPart p14:bwMode="auto" r:id="rId10">
               <p14:nvContentPartPr>
                 <p14:cNvPr id="11" name="Ink 10">
@@ -4941,7 +4894,7 @@
               </p14:xfrm>
             </p:contentPart>
           </mc:Choice>
-          <mc:Fallback>
+          <mc:Fallback xmlns="">
             <p:pic>
               <p:nvPicPr>
                 <p:cNvPr id="11" name="Ink 10">
@@ -4972,8 +4925,8 @@
             </p:pic>
           </mc:Fallback>
         </mc:AlternateContent>
-        <mc:AlternateContent xmlns:mc="http://schemas.openxmlformats.org/markup-compatibility/2006">
-          <mc:Choice xmlns:p14="http://schemas.microsoft.com/office/powerpoint/2010/main" Requires="p14">
+        <mc:AlternateContent xmlns:mc="http://schemas.openxmlformats.org/markup-compatibility/2006" xmlns:p14="http://schemas.microsoft.com/office/powerpoint/2010/main">
+          <mc:Choice Requires="p14">
             <p:contentPart p14:bwMode="auto" r:id="rId12">
               <p14:nvContentPartPr>
                 <p14:cNvPr id="13" name="Ink 12">
@@ -4992,7 +4945,7 @@
               </p14:xfrm>
             </p:contentPart>
           </mc:Choice>
-          <mc:Fallback>
+          <mc:Fallback xmlns="">
             <p:pic>
               <p:nvPicPr>
                 <p:cNvPr id="13" name="Ink 12">
@@ -5023,8 +4976,8 @@
             </p:pic>
           </mc:Fallback>
         </mc:AlternateContent>
-        <mc:AlternateContent xmlns:mc="http://schemas.openxmlformats.org/markup-compatibility/2006">
-          <mc:Choice xmlns:p14="http://schemas.microsoft.com/office/powerpoint/2010/main" Requires="p14">
+        <mc:AlternateContent xmlns:mc="http://schemas.openxmlformats.org/markup-compatibility/2006" xmlns:p14="http://schemas.microsoft.com/office/powerpoint/2010/main">
+          <mc:Choice Requires="p14">
             <p:contentPart p14:bwMode="auto" r:id="rId14">
               <p14:nvContentPartPr>
                 <p14:cNvPr id="14" name="Ink 13">
@@ -5043,7 +4996,7 @@
               </p14:xfrm>
             </p:contentPart>
           </mc:Choice>
-          <mc:Fallback>
+          <mc:Fallback xmlns="">
             <p:pic>
               <p:nvPicPr>
                 <p:cNvPr id="14" name="Ink 13">
@@ -5074,8 +5027,8 @@
             </p:pic>
           </mc:Fallback>
         </mc:AlternateContent>
-        <mc:AlternateContent xmlns:mc="http://schemas.openxmlformats.org/markup-compatibility/2006">
-          <mc:Choice xmlns:p14="http://schemas.microsoft.com/office/powerpoint/2010/main" Requires="p14">
+        <mc:AlternateContent xmlns:mc="http://schemas.openxmlformats.org/markup-compatibility/2006" xmlns:p14="http://schemas.microsoft.com/office/powerpoint/2010/main">
+          <mc:Choice Requires="p14">
             <p:contentPart p14:bwMode="auto" r:id="rId16">
               <p14:nvContentPartPr>
                 <p14:cNvPr id="15" name="Ink 14">
@@ -5094,7 +5047,7 @@
               </p14:xfrm>
             </p:contentPart>
           </mc:Choice>
-          <mc:Fallback>
+          <mc:Fallback xmlns="">
             <p:pic>
               <p:nvPicPr>
                 <p:cNvPr id="15" name="Ink 14">
@@ -5146,8 +5099,8 @@
             <a:chExt cx="1288440" cy="518040"/>
           </a:xfrm>
         </p:grpSpPr>
-        <mc:AlternateContent xmlns:mc="http://schemas.openxmlformats.org/markup-compatibility/2006">
-          <mc:Choice xmlns:p14="http://schemas.microsoft.com/office/powerpoint/2010/main" Requires="p14">
+        <mc:AlternateContent xmlns:mc="http://schemas.openxmlformats.org/markup-compatibility/2006" xmlns:p14="http://schemas.microsoft.com/office/powerpoint/2010/main">
+          <mc:Choice Requires="p14">
             <p:contentPart p14:bwMode="auto" r:id="rId18">
               <p14:nvContentPartPr>
                 <p14:cNvPr id="17" name="Ink 16">
@@ -5166,7 +5119,7 @@
               </p14:xfrm>
             </p:contentPart>
           </mc:Choice>
-          <mc:Fallback>
+          <mc:Fallback xmlns="">
             <p:pic>
               <p:nvPicPr>
                 <p:cNvPr id="17" name="Ink 16">
@@ -5197,8 +5150,8 @@
             </p:pic>
           </mc:Fallback>
         </mc:AlternateContent>
-        <mc:AlternateContent xmlns:mc="http://schemas.openxmlformats.org/markup-compatibility/2006">
-          <mc:Choice xmlns:p14="http://schemas.microsoft.com/office/powerpoint/2010/main" Requires="p14">
+        <mc:AlternateContent xmlns:mc="http://schemas.openxmlformats.org/markup-compatibility/2006" xmlns:p14="http://schemas.microsoft.com/office/powerpoint/2010/main">
+          <mc:Choice Requires="p14">
             <p:contentPart p14:bwMode="auto" r:id="rId20">
               <p14:nvContentPartPr>
                 <p14:cNvPr id="18" name="Ink 17">
@@ -5217,7 +5170,7 @@
               </p14:xfrm>
             </p:contentPart>
           </mc:Choice>
-          <mc:Fallback>
+          <mc:Fallback xmlns="">
             <p:pic>
               <p:nvPicPr>
                 <p:cNvPr id="18" name="Ink 17">
@@ -5248,8 +5201,8 @@
             </p:pic>
           </mc:Fallback>
         </mc:AlternateContent>
-        <mc:AlternateContent xmlns:mc="http://schemas.openxmlformats.org/markup-compatibility/2006">
-          <mc:Choice xmlns:p14="http://schemas.microsoft.com/office/powerpoint/2010/main" Requires="p14">
+        <mc:AlternateContent xmlns:mc="http://schemas.openxmlformats.org/markup-compatibility/2006" xmlns:p14="http://schemas.microsoft.com/office/powerpoint/2010/main">
+          <mc:Choice Requires="p14">
             <p:contentPart p14:bwMode="auto" r:id="rId22">
               <p14:nvContentPartPr>
                 <p14:cNvPr id="19" name="Ink 18">
@@ -5268,7 +5221,7 @@
               </p14:xfrm>
             </p:contentPart>
           </mc:Choice>
-          <mc:Fallback>
+          <mc:Fallback xmlns="">
             <p:pic>
               <p:nvPicPr>
                 <p:cNvPr id="19" name="Ink 18">
@@ -5299,8 +5252,8 @@
             </p:pic>
           </mc:Fallback>
         </mc:AlternateContent>
-        <mc:AlternateContent xmlns:mc="http://schemas.openxmlformats.org/markup-compatibility/2006">
-          <mc:Choice xmlns:p14="http://schemas.microsoft.com/office/powerpoint/2010/main" Requires="p14">
+        <mc:AlternateContent xmlns:mc="http://schemas.openxmlformats.org/markup-compatibility/2006" xmlns:p14="http://schemas.microsoft.com/office/powerpoint/2010/main">
+          <mc:Choice Requires="p14">
             <p:contentPart p14:bwMode="auto" r:id="rId24">
               <p14:nvContentPartPr>
                 <p14:cNvPr id="20" name="Ink 19">
@@ -5319,7 +5272,7 @@
               </p14:xfrm>
             </p:contentPart>
           </mc:Choice>
-          <mc:Fallback>
+          <mc:Fallback xmlns="">
             <p:pic>
               <p:nvPicPr>
                 <p:cNvPr id="20" name="Ink 19">
@@ -5350,8 +5303,8 @@
             </p:pic>
           </mc:Fallback>
         </mc:AlternateContent>
-        <mc:AlternateContent xmlns:mc="http://schemas.openxmlformats.org/markup-compatibility/2006">
-          <mc:Choice xmlns:p14="http://schemas.microsoft.com/office/powerpoint/2010/main" Requires="p14">
+        <mc:AlternateContent xmlns:mc="http://schemas.openxmlformats.org/markup-compatibility/2006" xmlns:p14="http://schemas.microsoft.com/office/powerpoint/2010/main">
+          <mc:Choice Requires="p14">
             <p:contentPart p14:bwMode="auto" r:id="rId26">
               <p14:nvContentPartPr>
                 <p14:cNvPr id="21" name="Ink 20">
@@ -5370,7 +5323,7 @@
               </p14:xfrm>
             </p:contentPart>
           </mc:Choice>
-          <mc:Fallback>
+          <mc:Fallback xmlns="">
             <p:pic>
               <p:nvPicPr>
                 <p:cNvPr id="21" name="Ink 20">
@@ -5441,94 +5394,113 @@
           </a:p>
         </p:txBody>
       </p:sp>
-      <p:sp>
-        <p:nvSpPr>
-          <p:cNvPr id="28" name="Down Arrow 27">
-            <a:extLst>
-              <a:ext uri="{FF2B5EF4-FFF2-40B4-BE49-F238E27FC236}">
-                <a16:creationId xmlns:a16="http://schemas.microsoft.com/office/drawing/2014/main" id="{BC338F1A-DB45-DB46-6A0F-176EE60CF3F1}"/>
-              </a:ext>
-            </a:extLst>
-          </p:cNvPr>
-          <p:cNvSpPr/>
-          <p:nvPr/>
-        </p:nvSpPr>
-        <p:spPr>
-          <a:xfrm rot="3995214">
-            <a:off x="3032390" y="1786005"/>
-            <a:ext cx="241758" cy="1088699"/>
-          </a:xfrm>
-          <a:prstGeom prst="downArrow">
-            <a:avLst/>
-          </a:prstGeom>
-          <a:solidFill>
-            <a:schemeClr val="bg1"/>
-          </a:solidFill>
-        </p:spPr>
-        <p:style>
-          <a:lnRef idx="2">
-            <a:schemeClr val="accent1">
-              <a:shade val="15000"/>
-            </a:schemeClr>
-          </a:lnRef>
-          <a:fillRef idx="1">
-            <a:schemeClr val="accent1"/>
-          </a:fillRef>
-          <a:effectRef idx="0">
-            <a:schemeClr val="accent1"/>
-          </a:effectRef>
-          <a:fontRef idx="minor">
-            <a:schemeClr val="lt1"/>
-          </a:fontRef>
-        </p:style>
-        <p:txBody>
-          <a:bodyPr rtlCol="0" anchor="ctr"/>
-          <a:lstStyle/>
-          <a:p>
-            <a:pPr algn="ctr"/>
-            <a:endParaRPr lang="en-US"/>
-          </a:p>
-        </p:txBody>
-      </p:sp>
-      <p:sp>
-        <p:nvSpPr>
-          <p:cNvPr id="29" name="TextBox 28">
-            <a:extLst>
-              <a:ext uri="{FF2B5EF4-FFF2-40B4-BE49-F238E27FC236}">
-                <a16:creationId xmlns:a16="http://schemas.microsoft.com/office/drawing/2014/main" id="{42251257-4CAA-E75C-CE40-B9FD2890B56F}"/>
-              </a:ext>
-            </a:extLst>
-          </p:cNvPr>
-          <p:cNvSpPr txBox="1"/>
-          <p:nvPr/>
-        </p:nvSpPr>
-        <p:spPr>
-          <a:xfrm>
-            <a:off x="3646060" y="1890799"/>
-            <a:ext cx="1812804" cy="369332"/>
-          </a:xfrm>
-          <a:prstGeom prst="rect">
-            <a:avLst/>
-          </a:prstGeom>
-          <a:noFill/>
-        </p:spPr>
-        <p:txBody>
-          <a:bodyPr wrap="none" rtlCol="0">
-            <a:spAutoFit/>
-          </a:bodyPr>
-          <a:lstStyle/>
-          <a:p>
-            <a:r>
-              <a:rPr lang="en-US" dirty="0"/>
-              <a:t>Channel erosion?</a:t>
-            </a:r>
-          </a:p>
-        </p:txBody>
-      </p:sp>
     </p:spTree>
     <p:extLst>
       <p:ext uri="{BB962C8B-B14F-4D97-AF65-F5344CB8AC3E}">
         <p14:creationId xmlns:p14="http://schemas.microsoft.com/office/powerpoint/2010/main" val="3910087933"/>
+      </p:ext>
+    </p:extLst>
+  </p:cSld>
+  <p:clrMapOvr>
+    <a:masterClrMapping/>
+  </p:clrMapOvr>
+</p:sld>
+</file>
+
+<file path=ppt/slides/slide7.xml><?xml version="1.0" encoding="utf-8"?>
+<p:sld xmlns:a="http://schemas.openxmlformats.org/drawingml/2006/main" xmlns:r="http://schemas.openxmlformats.org/officeDocument/2006/relationships" xmlns:p="http://schemas.openxmlformats.org/presentationml/2006/main">
+  <p:cSld>
+    <p:spTree>
+      <p:nvGrpSpPr>
+        <p:cNvPr id="1" name=""/>
+        <p:cNvGrpSpPr/>
+        <p:nvPr/>
+      </p:nvGrpSpPr>
+      <p:grpSpPr>
+        <a:xfrm>
+          <a:off x="0" y="0"/>
+          <a:ext cx="0" cy="0"/>
+          <a:chOff x="0" y="0"/>
+          <a:chExt cx="0" cy="0"/>
+        </a:xfrm>
+      </p:grpSpPr>
+      <p:sp>
+        <p:nvSpPr>
+          <p:cNvPr id="2" name="Title 1">
+            <a:extLst>
+              <a:ext uri="{FF2B5EF4-FFF2-40B4-BE49-F238E27FC236}">
+                <a16:creationId xmlns:a16="http://schemas.microsoft.com/office/drawing/2014/main" id="{86CD9A29-F761-4B8C-5C5B-40DB1017DD88}"/>
+              </a:ext>
+            </a:extLst>
+          </p:cNvPr>
+          <p:cNvSpPr>
+            <a:spLocks noGrp="1"/>
+          </p:cNvSpPr>
+          <p:nvPr>
+            <p:ph type="title"/>
+          </p:nvPr>
+        </p:nvSpPr>
+        <p:spPr/>
+        <p:txBody>
+          <a:bodyPr/>
+          <a:lstStyle/>
+          <a:p>
+            <a:r>
+              <a:rPr lang="en-US" dirty="0"/>
+              <a:t>Moving forward</a:t>
+            </a:r>
+          </a:p>
+        </p:txBody>
+      </p:sp>
+      <p:sp>
+        <p:nvSpPr>
+          <p:cNvPr id="3" name="Content Placeholder 2">
+            <a:extLst>
+              <a:ext uri="{FF2B5EF4-FFF2-40B4-BE49-F238E27FC236}">
+                <a16:creationId xmlns:a16="http://schemas.microsoft.com/office/drawing/2014/main" id="{FE032DC0-C5CE-A0E8-04DB-4EBCB16001C9}"/>
+              </a:ext>
+            </a:extLst>
+          </p:cNvPr>
+          <p:cNvSpPr>
+            <a:spLocks noGrp="1"/>
+          </p:cNvSpPr>
+          <p:nvPr>
+            <p:ph idx="1"/>
+          </p:nvPr>
+        </p:nvSpPr>
+        <p:spPr/>
+        <p:txBody>
+          <a:bodyPr/>
+          <a:lstStyle/>
+          <a:p>
+            <a:r>
+              <a:rPr lang="en-US" dirty="0"/>
+              <a:t>We want to contact a geodesist to inquire about possible datum/geoid mismatches.</a:t>
+            </a:r>
+          </a:p>
+          <a:p>
+            <a:r>
+              <a:rPr lang="en-US" dirty="0"/>
+              <a:t>Also want to contact someone at NLD or Army Corps who has information on when NLD profiles were generated</a:t>
+            </a:r>
+          </a:p>
+          <a:p>
+            <a:r>
+              <a:rPr lang="en-US" dirty="0"/>
+              <a:t>Once we have figured the above out: all USACE levees can be investigated. We will automate change detection to spot levees where damage has occurred between the time of the original profile and the 3DEP data (</a:t>
+            </a:r>
+            <a:r>
+              <a:rPr lang="en-US"/>
+              <a:t>2010 –present) </a:t>
+            </a:r>
+            <a:endParaRPr lang="en-US" dirty="0"/>
+          </a:p>
+        </p:txBody>
+      </p:sp>
+    </p:spTree>
+    <p:extLst>
+      <p:ext uri="{BB962C8B-B14F-4D97-AF65-F5344CB8AC3E}">
+        <p14:creationId xmlns:p14="http://schemas.microsoft.com/office/powerpoint/2010/main" val="3948675249"/>
       </p:ext>
     </p:extLst>
   </p:cSld>

</xml_diff>